<commit_message>
tag for release 0.9.61
</commit_message>
<xml_diff>
--- a/DGE_Tools_Intro_Feb2018.pptx
+++ b/DGE_Tools_Intro_Feb2018.pptx
@@ -3800,11 +3800,7 @@
             </a:r>
             <a:r>
               <a:rPr lang="en-US" sz="1600" b="0" dirty="0" smtClean="0"/>
-              <a:t> </a:t>
-            </a:r>
-            <a:r>
-              <a:rPr lang="en-US" sz="1600" b="0" dirty="0" smtClean="0"/>
-              <a:t>= </a:t>
+              <a:t> = </a:t>
             </a:r>
             <a:r>
               <a:rPr lang="en-US" sz="1600" b="0" dirty="0" err="1"/>
@@ -3852,7 +3848,6 @@
               <a:rPr lang="en-US" sz="1600" b="0" dirty="0" smtClean="0"/>
               <a:t> pipeline</a:t>
             </a:r>
-            <a:endParaRPr lang="en-US" sz="1600" b="0" dirty="0" smtClean="0"/>
           </a:p>
           <a:p>
             <a:r>
@@ -4008,11 +4003,7 @@
             </a:r>
             <a:r>
               <a:rPr lang="en-US" sz="1600" b="0" dirty="0" smtClean="0"/>
-              <a:t> </a:t>
-            </a:r>
-            <a:r>
-              <a:rPr lang="en-US" sz="1600" b="0" dirty="0" smtClean="0"/>
-              <a:t>with </a:t>
+              <a:t> with </a:t>
             </a:r>
             <a:r>
               <a:rPr lang="en-US" sz="1600" b="0" dirty="0" err="1" smtClean="0"/>
@@ -4028,11 +4019,7 @@
             </a:r>
             <a:r>
               <a:rPr lang="en-US" sz="1600" b="0" dirty="0" smtClean="0"/>
-              <a:t> etc</a:t>
-            </a:r>
-            <a:r>
-              <a:rPr lang="en-US" sz="1600" b="0" dirty="0" smtClean="0"/>
-              <a:t>.</a:t>
+              <a:t> etc.</a:t>
             </a:r>
           </a:p>
           <a:p>
@@ -5453,7 +5440,6 @@
               <a:rPr lang="en-US" sz="2000" b="0" dirty="0" smtClean="0"/>
               <a:t> (aka MA plot)</a:t>
             </a:r>
-            <a:endParaRPr lang="en-US" sz="2000" b="0" dirty="0" smtClean="0"/>
           </a:p>
           <a:p>
             <a:pPr marL="457200" indent="-457200">
@@ -5501,13 +5487,8 @@
             </a:r>
             <a:r>
               <a:rPr lang="en-US" sz="2000" b="0" dirty="0" smtClean="0"/>
-              <a:t> of 2 treatment </a:t>
-            </a:r>
-            <a:r>
-              <a:rPr lang="en-US" sz="2000" b="0" dirty="0" smtClean="0"/>
-              <a:t>groups</a:t>
-            </a:r>
-            <a:endParaRPr lang="en-US" sz="2000" b="0" dirty="0" smtClean="0"/>
+              <a:t> of 2 treatment groups</a:t>
+            </a:r>
           </a:p>
         </p:txBody>
       </p:sp>
@@ -7028,7 +7009,7 @@
             <a:prstDash val="solid"/>
             <a:round/>
             <a:headEnd type="none" w="lg" len="lg"/>
-            <a:tailEnd type="stealth" w="lg" len="lg"/>
+            <a:tailEnd type="none" w="lg" len="lg"/>
           </a:ln>
           <a:effectLst/>
         </p:spPr>
@@ -7066,7 +7047,7 @@
             </a:solidFill>
             <a:prstDash val="solid"/>
             <a:round/>
-            <a:headEnd type="none" w="lg" len="lg"/>
+            <a:headEnd type="stealth" w="lg" len="lg"/>
             <a:tailEnd type="none" w="lg" len="lg"/>
           </a:ln>
           <a:effectLst/>
@@ -7110,18 +7091,56 @@
           </a:p>
         </p:txBody>
       </p:sp>
+      <p:sp>
+        <p:nvSpPr>
+          <p:cNvPr id="35" name="TextBox 34"/>
+          <p:cNvSpPr txBox="1"/>
+          <p:nvPr/>
+        </p:nvSpPr>
+        <p:spPr>
+          <a:xfrm>
+            <a:off x="6689377" y="3048423"/>
+            <a:ext cx="841898" cy="307777"/>
+          </a:xfrm>
+          <a:prstGeom prst="rect">
+            <a:avLst/>
+          </a:prstGeom>
+          <a:noFill/>
+        </p:spPr>
+        <p:txBody>
+          <a:bodyPr wrap="none" rtlCol="0">
+            <a:spAutoFit/>
+          </a:bodyPr>
+          <a:lstStyle/>
+          <a:p>
+            <a:r>
+              <a:rPr lang="en-US" sz="1400" dirty="0" err="1" smtClean="0">
+                <a:solidFill>
+                  <a:srgbClr val="FF0000"/>
+                </a:solidFill>
+              </a:rPr>
+              <a:t>DGEobj</a:t>
+            </a:r>
+            <a:endParaRPr lang="en-US" sz="1400" dirty="0">
+              <a:solidFill>
+                <a:srgbClr val="FF0000"/>
+              </a:solidFill>
+            </a:endParaRPr>
+          </a:p>
+        </p:txBody>
+      </p:sp>
       <p:cxnSp>
         <p:nvCxnSpPr>
-          <p:cNvPr id="11" name="Elbow Connector 10"/>
+          <p:cNvPr id="16" name="Elbow Connector 15"/>
           <p:cNvCxnSpPr>
-            <a:endCxn id="10" idx="2"/>
+            <a:stCxn id="10" idx="1"/>
           </p:cNvCxnSpPr>
           <p:nvPr/>
         </p:nvCxnSpPr>
         <p:spPr bwMode="auto">
-          <a:xfrm flipV="1">
-            <a:off x="5230939" y="4531572"/>
-            <a:ext cx="2412910" cy="545590"/>
+          <a:xfrm rot="10800000">
+            <a:off x="6481764" y="3161212"/>
+            <a:ext cx="483429" cy="1179545"/>
           </a:xfrm>
           <a:prstGeom prst="bentConnector2">
             <a:avLst/>
@@ -7143,88 +7162,12 @@
             </a:solidFill>
             <a:prstDash val="solid"/>
             <a:round/>
-            <a:headEnd type="none" w="lg" len="lg"/>
+            <a:headEnd type="none" w="med" len="med"/>
             <a:tailEnd type="stealth" w="lg" len="lg"/>
           </a:ln>
           <a:effectLst/>
         </p:spPr>
       </p:cxnSp>
-      <p:sp>
-        <p:nvSpPr>
-          <p:cNvPr id="34" name="TextBox 33"/>
-          <p:cNvSpPr txBox="1"/>
-          <p:nvPr/>
-        </p:nvSpPr>
-        <p:spPr>
-          <a:xfrm>
-            <a:off x="6060814" y="4778824"/>
-            <a:ext cx="841898" cy="307777"/>
-          </a:xfrm>
-          <a:prstGeom prst="rect">
-            <a:avLst/>
-          </a:prstGeom>
-          <a:noFill/>
-        </p:spPr>
-        <p:txBody>
-          <a:bodyPr wrap="none" rtlCol="0">
-            <a:spAutoFit/>
-          </a:bodyPr>
-          <a:lstStyle/>
-          <a:p>
-            <a:r>
-              <a:rPr lang="en-US" sz="1400" dirty="0" err="1" smtClean="0">
-                <a:solidFill>
-                  <a:srgbClr val="FF0000"/>
-                </a:solidFill>
-              </a:rPr>
-              <a:t>DGEobj</a:t>
-            </a:r>
-            <a:endParaRPr lang="en-US" sz="1400" dirty="0">
-              <a:solidFill>
-                <a:srgbClr val="FF0000"/>
-              </a:solidFill>
-            </a:endParaRPr>
-          </a:p>
-        </p:txBody>
-      </p:sp>
-      <p:sp>
-        <p:nvSpPr>
-          <p:cNvPr id="35" name="TextBox 34"/>
-          <p:cNvSpPr txBox="1"/>
-          <p:nvPr/>
-        </p:nvSpPr>
-        <p:spPr>
-          <a:xfrm>
-            <a:off x="6689377" y="3048423"/>
-            <a:ext cx="841898" cy="307777"/>
-          </a:xfrm>
-          <a:prstGeom prst="rect">
-            <a:avLst/>
-          </a:prstGeom>
-          <a:noFill/>
-        </p:spPr>
-        <p:txBody>
-          <a:bodyPr wrap="none" rtlCol="0">
-            <a:spAutoFit/>
-          </a:bodyPr>
-          <a:lstStyle/>
-          <a:p>
-            <a:r>
-              <a:rPr lang="en-US" sz="1400" dirty="0" err="1" smtClean="0">
-                <a:solidFill>
-                  <a:srgbClr val="FF0000"/>
-                </a:solidFill>
-              </a:rPr>
-              <a:t>DGEobj</a:t>
-            </a:r>
-            <a:endParaRPr lang="en-US" sz="1400" dirty="0">
-              <a:solidFill>
-                <a:srgbClr val="FF0000"/>
-              </a:solidFill>
-            </a:endParaRPr>
-          </a:p>
-        </p:txBody>
-      </p:sp>
     </p:spTree>
     <p:extLst>
       <p:ext uri="{BB962C8B-B14F-4D97-AF65-F5344CB8AC3E}">
@@ -7282,11 +7225,7 @@
           <a:p>
             <a:r>
               <a:rPr lang="en-US" dirty="0" smtClean="0"/>
-              <a:t>Practical Noise </a:t>
-            </a:r>
-            <a:r>
-              <a:rPr lang="en-US" dirty="0" smtClean="0"/>
-              <a:t>(low count) Filtering</a:t>
+              <a:t>Practical Noise (low count) Filtering</a:t>
             </a:r>
             <a:endParaRPr lang="en-US" dirty="0"/>
           </a:p>
@@ -7340,11 +7279,7 @@
           <a:p>
             <a:r>
               <a:rPr lang="en-US" sz="2000" dirty="0" smtClean="0"/>
-              <a:t>3 </a:t>
-            </a:r>
-            <a:r>
-              <a:rPr lang="en-US" sz="2000" dirty="0" smtClean="0"/>
-              <a:t>Methods in common use:</a:t>
+              <a:t>3 Methods in common use:</a:t>
             </a:r>
           </a:p>
           <a:p>
@@ -7368,11 +7303,7 @@
             </a:r>
             <a:r>
               <a:rPr lang="en-US" sz="2000" dirty="0" smtClean="0"/>
-              <a:t> </a:t>
-            </a:r>
-            <a:r>
-              <a:rPr lang="en-US" sz="2000" dirty="0" smtClean="0"/>
-              <a:t>&gt;= 10</a:t>
+              <a:t> &gt;= 10</a:t>
             </a:r>
           </a:p>
           <a:p>
@@ -7396,11 +7327,7 @@
             </a:pPr>
             <a:r>
               <a:rPr lang="en-US" sz="2000" dirty="0" smtClean="0"/>
-              <a:t>JRT </a:t>
-            </a:r>
-            <a:r>
-              <a:rPr lang="en-US" sz="2000" dirty="0" smtClean="0"/>
-              <a:t>Recommendations: </a:t>
+              <a:t>JRT Recommendations: </a:t>
             </a:r>
           </a:p>
           <a:p>
@@ -10563,7 +10490,6 @@
               <a:rPr lang="en-US" sz="1600" b="0" dirty="0" smtClean="0"/>
               <a:t>Templates shorten turn around time</a:t>
             </a:r>
-            <a:endParaRPr lang="en-US" sz="1600" b="0" dirty="0" smtClean="0"/>
           </a:p>
           <a:p>
             <a:r>
@@ -10578,7 +10504,6 @@
               <a:rPr lang="en-US" sz="1800" b="0" dirty="0" smtClean="0"/>
               <a:t>A flexible data structure to capture annotated results of analysis</a:t>
             </a:r>
-            <a:endParaRPr lang="en-US" sz="1800" b="0" dirty="0" smtClean="0"/>
           </a:p>
           <a:p>
             <a:pPr marL="806450" lvl="1" indent="-342900">
@@ -10605,7 +10530,6 @@
               <a:rPr lang="en-US" sz="1600" b="0" dirty="0" smtClean="0"/>
               <a:t>Produces a consistently annotated reusable data object</a:t>
             </a:r>
-            <a:endParaRPr lang="en-US" sz="1600" b="0" dirty="0" smtClean="0"/>
           </a:p>
           <a:p>
             <a:pPr marL="1138238" lvl="2" indent="-342900">
@@ -10617,15 +10541,7 @@
             </a:pPr>
             <a:r>
               <a:rPr lang="en-US" sz="1600" b="0" dirty="0" smtClean="0"/>
-              <a:t>Facilitates </a:t>
-            </a:r>
-            <a:r>
-              <a:rPr lang="en-US" sz="1600" b="0" dirty="0" smtClean="0"/>
-              <a:t>data re-use for downstream </a:t>
-            </a:r>
-            <a:r>
-              <a:rPr lang="en-US" sz="1600" b="0" dirty="0" smtClean="0"/>
-              <a:t>applications</a:t>
+              <a:t>Facilitates data re-use for downstream applications</a:t>
             </a:r>
           </a:p>
           <a:p>
@@ -10785,11 +10701,7 @@
             </a:r>
             <a:r>
               <a:rPr lang="en-US" sz="1400" b="0" dirty="0" smtClean="0"/>
-              <a:t>, </a:t>
-            </a:r>
-            <a:r>
-              <a:rPr lang="en-US" sz="1400" b="0" dirty="0" smtClean="0"/>
-              <a:t>DGE.Tools2, Xpress2R, </a:t>
+              <a:t>, DGE.Tools2, Xpress2R, </a:t>
             </a:r>
             <a:r>
               <a:rPr lang="en-US" sz="1400" b="0" dirty="0" err="1" smtClean="0"/>
@@ -11086,7 +10998,6 @@
               <a:rPr lang="en-US" sz="2400" dirty="0" smtClean="0"/>
               <a:t>)</a:t>
             </a:r>
-            <a:endParaRPr lang="en-US" sz="2400" dirty="0" smtClean="0"/>
           </a:p>
           <a:p>
             <a:pPr>
@@ -11489,11 +11400,7 @@
           <a:p>
             <a:r>
               <a:rPr lang="en-US" dirty="0" smtClean="0"/>
-              <a:t>Using </a:t>
-            </a:r>
-            <a:r>
-              <a:rPr lang="en-US" dirty="0" smtClean="0"/>
-              <a:t>zFPKM to select expressed genes</a:t>
+              <a:t>Using zFPKM to select expressed genes</a:t>
             </a:r>
             <a:endParaRPr lang="en-US" dirty="0"/>
           </a:p>
@@ -11590,13 +11497,8 @@
           <a:p>
             <a:r>
               <a:rPr lang="en-US" sz="2400" b="0" dirty="0" smtClean="0"/>
-              <a:t>R Implementation: Ron </a:t>
-            </a:r>
-            <a:r>
-              <a:rPr lang="en-US" sz="2400" b="0" dirty="0" smtClean="0"/>
-              <a:t>Ammar (in Bioconductor)</a:t>
-            </a:r>
-            <a:endParaRPr lang="en-US" sz="2400" b="0" dirty="0" smtClean="0"/>
+              <a:t>R Implementation: Ron Ammar (in Bioconductor)</a:t>
+            </a:r>
           </a:p>
         </p:txBody>
       </p:sp>
@@ -13398,23 +13300,7 @@
             </a:pPr>
             <a:r>
               <a:rPr lang="en-US" sz="1400" b="0" dirty="0" smtClean="0"/>
-              <a:t>A series of modular functions to standardize </a:t>
-            </a:r>
-            <a:r>
-              <a:rPr lang="en-US" sz="1400" b="0" dirty="0" smtClean="0"/>
-              <a:t>best practices while </a:t>
-            </a:r>
-            <a:r>
-              <a:rPr lang="en-US" sz="1400" b="0" dirty="0" smtClean="0"/>
-              <a:t>remaining flexible enough to handle </a:t>
-            </a:r>
-            <a:r>
-              <a:rPr lang="en-US" sz="1400" b="0" dirty="0" smtClean="0"/>
-              <a:t>most </a:t>
-            </a:r>
-            <a:r>
-              <a:rPr lang="en-US" sz="1400" b="0" dirty="0" smtClean="0"/>
-              <a:t>common variations</a:t>
+              <a:t>A series of modular functions to standardize best practices while remaining flexible enough to handle most common variations</a:t>
             </a:r>
           </a:p>
           <a:p>
@@ -13435,11 +13321,7 @@
             </a:r>
             <a:r>
               <a:rPr lang="en-US" sz="1400" b="0" dirty="0" smtClean="0"/>
-              <a:t> Quality </a:t>
-            </a:r>
-            <a:r>
-              <a:rPr lang="en-US" sz="1400" b="0" dirty="0" smtClean="0"/>
-              <a:t>Weights, Nested Designs (</a:t>
+              <a:t> Quality Weights, Nested Designs (</a:t>
             </a:r>
             <a:r>
               <a:rPr lang="en-US" sz="1400" b="0" dirty="0" err="1" smtClean="0"/>
@@ -13455,13 +13337,8 @@
             </a:r>
             <a:r>
               <a:rPr lang="en-US" sz="1400" b="0" dirty="0" smtClean="0"/>
-              <a:t> </a:t>
-            </a:r>
-            <a:r>
-              <a:rPr lang="en-US" sz="1400" b="0" dirty="0" smtClean="0"/>
-              <a:t>unknown variable (Surrogate Variable Analysis)</a:t>
-            </a:r>
-            <a:endParaRPr lang="en-US" sz="1400" b="0" dirty="0" smtClean="0"/>
+              <a:t> unknown variable (Surrogate Variable Analysis)</a:t>
+            </a:r>
           </a:p>
           <a:p>
             <a:r>
@@ -13540,11 +13417,7 @@
           <a:p>
             <a:r>
               <a:rPr lang="en-US" sz="2000" dirty="0" smtClean="0"/>
-              <a:t>Unit Conversion</a:t>
-            </a:r>
-            <a:r>
-              <a:rPr lang="en-US" sz="2000" dirty="0" smtClean="0"/>
-              <a:t>: </a:t>
+              <a:t>Unit Conversion: </a:t>
             </a:r>
             <a:r>
               <a:rPr lang="en-US" sz="2000" b="0" dirty="0" smtClean="0"/>
@@ -13683,19 +13556,7 @@
           <a:p>
             <a:r>
               <a:rPr lang="en-US" dirty="0" smtClean="0"/>
-              <a:t>Evolution </a:t>
-            </a:r>
-            <a:r>
-              <a:rPr lang="en-US" dirty="0" smtClean="0"/>
-              <a:t>of </a:t>
-            </a:r>
-            <a:r>
-              <a:rPr lang="en-US" dirty="0" smtClean="0"/>
-              <a:t>Gene Expression Data </a:t>
-            </a:r>
-            <a:r>
-              <a:rPr lang="en-US" dirty="0" smtClean="0"/>
-              <a:t>Objects</a:t>
+              <a:t>Evolution of Gene Expression Data Objects</a:t>
             </a:r>
             <a:endParaRPr lang="en-US" dirty="0"/>
           </a:p>
@@ -13723,15 +13584,7 @@
           <a:p>
             <a:r>
               <a:rPr lang="en-US" sz="1800" dirty="0" smtClean="0"/>
-              <a:t>Two standard </a:t>
-            </a:r>
-            <a:r>
-              <a:rPr lang="en-US" sz="1800" dirty="0" smtClean="0"/>
-              <a:t>Bioconductor data </a:t>
-            </a:r>
-            <a:r>
-              <a:rPr lang="en-US" sz="1800" dirty="0" smtClean="0"/>
-              <a:t>containers for expression data introduced</a:t>
+              <a:t>Two standard Bioconductor data containers for expression data introduced</a:t>
             </a:r>
           </a:p>
           <a:p>
@@ -13757,17 +13610,12 @@
             </a:r>
             <a:r>
               <a:rPr lang="en-US" sz="1600" dirty="0" smtClean="0"/>
-              <a:t> </a:t>
-            </a:r>
-            <a:r>
-              <a:rPr lang="en-US" sz="1600" dirty="0" smtClean="0"/>
-              <a:t>(RSE): </a:t>
+              <a:t> (RSE): </a:t>
             </a:r>
             <a:r>
               <a:rPr lang="en-US" sz="1600" b="0" dirty="0" smtClean="0"/>
               <a:t>ES concept updated for RNA-Sea</a:t>
             </a:r>
-            <a:endParaRPr lang="en-US" sz="1600" b="0" dirty="0" smtClean="0"/>
           </a:p>
           <a:p>
             <a:pPr lvl="2">
@@ -13792,11 +13640,7 @@
             </a:pPr>
             <a:r>
               <a:rPr lang="en-US" sz="1400" b="0" dirty="0" smtClean="0"/>
-              <a:t>Provides a </a:t>
-            </a:r>
-            <a:r>
-              <a:rPr lang="en-US" sz="1400" b="0" dirty="0" smtClean="0"/>
-              <a:t>square bracket, </a:t>
+              <a:t>Provides a square bracket, </a:t>
             </a:r>
             <a:r>
               <a:rPr lang="en-US" sz="1400" b="0" dirty="0" err="1" smtClean="0"/>
@@ -13804,11 +13648,7 @@
             </a:r>
             <a:r>
               <a:rPr lang="en-US" sz="1400" b="0" dirty="0" smtClean="0"/>
-              <a:t> </a:t>
-            </a:r>
-            <a:r>
-              <a:rPr lang="en-US" sz="1400" b="0" dirty="0" smtClean="0"/>
-              <a:t>container for RNA-Seq raw data</a:t>
+              <a:t> container for RNA-Seq raw data</a:t>
             </a:r>
             <a:endParaRPr lang="en-US" sz="1400" b="0" dirty="0" smtClean="0">
               <a:solidFill>
@@ -13843,23 +13683,7 @@
                   <a:srgbClr val="FF0000"/>
                 </a:solidFill>
               </a:rPr>
-              <a:t>Not suitable for </a:t>
-            </a:r>
-            <a:r>
-              <a:rPr lang="en-US" sz="1400" i="1" dirty="0" smtClean="0">
-                <a:solidFill>
-                  <a:srgbClr val="FF0000"/>
-                </a:solidFill>
-              </a:rPr>
-              <a:t>capturing </a:t>
-            </a:r>
-            <a:r>
-              <a:rPr lang="en-US" sz="1400" i="1" dirty="0" smtClean="0">
-                <a:solidFill>
-                  <a:srgbClr val="FF0000"/>
-                </a:solidFill>
-              </a:rPr>
-              <a:t>downstream results</a:t>
+              <a:t>Not suitable for capturing downstream results</a:t>
             </a:r>
           </a:p>
           <a:p>
@@ -13897,11 +13721,7 @@
             </a:pPr>
             <a:r>
               <a:rPr lang="en-US" sz="1600" b="0" dirty="0" smtClean="0"/>
-              <a:t>Fundamentally </a:t>
-            </a:r>
-            <a:r>
-              <a:rPr lang="en-US" sz="1600" b="0" dirty="0" smtClean="0"/>
-              <a:t>a simple list of data items with attributes</a:t>
+              <a:t>Fundamentally a simple list of data items with attributes</a:t>
             </a:r>
           </a:p>
           <a:p>
@@ -13912,19 +13732,7 @@
             </a:pPr>
             <a:r>
               <a:rPr lang="en-US" sz="1600" b="0" dirty="0" smtClean="0"/>
-              <a:t>Borrows RSE key </a:t>
-            </a:r>
-            <a:r>
-              <a:rPr lang="en-US" sz="1600" b="0" dirty="0" smtClean="0"/>
-              <a:t>concepts </a:t>
-            </a:r>
-            <a:r>
-              <a:rPr lang="en-US" sz="1600" b="0" dirty="0" smtClean="0"/>
-              <a:t>of assay, row, col, meta data </a:t>
-            </a:r>
-            <a:r>
-              <a:rPr lang="en-US" sz="1600" b="0" dirty="0" smtClean="0"/>
-              <a:t>types</a:t>
+              <a:t>Borrows RSE key concepts of assay, row, col, meta data types</a:t>
             </a:r>
           </a:p>
           <a:p>
@@ -13937,7 +13745,6 @@
               <a:rPr lang="en-US" sz="1400" b="0" dirty="0" smtClean="0"/>
               <a:t>Extended to support multiple row and col data types</a:t>
             </a:r>
-            <a:endParaRPr lang="en-US" sz="1400" b="0" dirty="0" smtClean="0"/>
           </a:p>
           <a:p>
             <a:pPr lvl="2">
@@ -13947,23 +13754,7 @@
             </a:pPr>
             <a:r>
               <a:rPr lang="en-US" sz="1600" b="0" dirty="0" smtClean="0"/>
-              <a:t>Attributes document data </a:t>
-            </a:r>
-            <a:r>
-              <a:rPr lang="en-US" sz="1600" b="0" dirty="0" smtClean="0"/>
-              <a:t>types, project </a:t>
-            </a:r>
-            <a:r>
-              <a:rPr lang="en-US" sz="1600" b="0" dirty="0" smtClean="0"/>
-              <a:t>metadata </a:t>
-            </a:r>
-            <a:r>
-              <a:rPr lang="en-US" sz="1600" b="0" dirty="0" smtClean="0"/>
-              <a:t>and </a:t>
-            </a:r>
-            <a:r>
-              <a:rPr lang="en-US" sz="1600" b="0" dirty="0" smtClean="0"/>
-              <a:t>capture workflow details</a:t>
+              <a:t>Attributes document data types, project metadata and capture workflow details</a:t>
             </a:r>
           </a:p>
           <a:p>
@@ -13974,11 +13765,7 @@
             </a:pPr>
             <a:r>
               <a:rPr lang="en-US" sz="1600" b="0" dirty="0" smtClean="0"/>
-              <a:t>Various function primitives </a:t>
-            </a:r>
-            <a:r>
-              <a:rPr lang="en-US" sz="1600" b="0" dirty="0" smtClean="0"/>
-              <a:t>for manipulating </a:t>
+              <a:t>Various function primitives for manipulating </a:t>
             </a:r>
             <a:r>
               <a:rPr lang="en-US" sz="1600" b="0" dirty="0" err="1" smtClean="0"/>
@@ -14018,11 +13805,7 @@
             </a:r>
             <a:r>
               <a:rPr lang="en-US" sz="1600" b="0" dirty="0" smtClean="0"/>
-              <a:t>, </a:t>
-            </a:r>
-            <a:r>
-              <a:rPr lang="en-US" sz="1600" b="0" dirty="0" smtClean="0"/>
-              <a:t>inventory, …</a:t>
+              <a:t>, inventory, …</a:t>
             </a:r>
           </a:p>
           <a:p>
@@ -14043,7 +13826,6 @@
               <a:rPr lang="en-US" sz="1600" b="0" dirty="0" smtClean="0"/>
               <a:t>, RSE and ES</a:t>
             </a:r>
-            <a:endParaRPr lang="en-US" sz="1600" b="0" dirty="0" smtClean="0"/>
           </a:p>
           <a:p>
             <a:pPr lvl="3">
@@ -14572,7 +14354,6 @@
               <a:rPr lang="en-US" sz="1600" b="0" dirty="0" smtClean="0"/>
               <a:t>metadata: Anything else</a:t>
             </a:r>
-            <a:endParaRPr lang="en-US" sz="1600" b="0" dirty="0" smtClean="0"/>
           </a:p>
           <a:p>
             <a:pPr algn="l"/>
@@ -14606,11 +14387,7 @@
             </a:r>
             <a:r>
               <a:rPr lang="en-US" sz="1600" b="0" dirty="0" smtClean="0"/>
-              <a:t> </a:t>
-            </a:r>
-            <a:r>
-              <a:rPr lang="en-US" sz="1600" b="0" dirty="0" smtClean="0"/>
-              <a:t>package builds </a:t>
+              <a:t> package builds </a:t>
             </a:r>
             <a:r>
               <a:rPr lang="en-US" sz="1600" b="0" dirty="0"/>
@@ -14796,11 +14573,7 @@
           <a:p>
             <a:r>
               <a:rPr lang="en-US" sz="2400" dirty="0" smtClean="0"/>
-              <a:t>Fundamentally </a:t>
-            </a:r>
-            <a:r>
-              <a:rPr lang="en-US" sz="2400" dirty="0" smtClean="0"/>
-              <a:t>a list of data objects</a:t>
+              <a:t>Fundamentally a list of data objects</a:t>
             </a:r>
           </a:p>
           <a:p>
@@ -14813,11 +14586,7 @@
             </a:pPr>
             <a:r>
               <a:rPr lang="en-US" sz="1800" b="0" dirty="0" smtClean="0"/>
-              <a:t>Starting with raw count </a:t>
-            </a:r>
-            <a:r>
-              <a:rPr lang="en-US" sz="1800" b="0" dirty="0" smtClean="0"/>
-              <a:t>data</a:t>
+              <a:t>Starting with raw count data</a:t>
             </a:r>
           </a:p>
           <a:p>
@@ -14832,7 +14601,6 @@
               <a:rPr lang="en-US" sz="1800" b="0" dirty="0" smtClean="0"/>
               <a:t>Captures gene and sample (design) data</a:t>
             </a:r>
-            <a:endParaRPr lang="en-US" sz="1800" b="0" dirty="0" smtClean="0"/>
           </a:p>
           <a:p>
             <a:pPr marL="920750" lvl="1" indent="-457200">
@@ -14844,32 +14612,14 @@
             </a:pPr>
             <a:r>
               <a:rPr lang="en-US" sz="1800" b="0" dirty="0" smtClean="0"/>
-              <a:t>captures multi-threaded downstream </a:t>
-            </a:r>
-            <a:r>
-              <a:rPr lang="en-US" sz="1800" b="0" dirty="0" smtClean="0"/>
-              <a:t>analysis </a:t>
-            </a:r>
-            <a:r>
-              <a:rPr lang="en-US" sz="1800" b="0" dirty="0" smtClean="0"/>
-              <a:t>results connected via parent attributes</a:t>
-            </a:r>
-            <a:endParaRPr lang="en-US" sz="1800" b="0" dirty="0" smtClean="0"/>
+              <a:t>captures multi-threaded downstream analysis results connected via parent attributes</a:t>
+            </a:r>
           </a:p>
           <a:p>
             <a:r>
               <a:rPr lang="en-US" sz="2400" dirty="0" smtClean="0"/>
-              <a:t>Exploit </a:t>
-            </a:r>
-            <a:r>
-              <a:rPr lang="en-US" sz="2400" dirty="0" smtClean="0"/>
-              <a:t>R “attributes” to capture </a:t>
-            </a:r>
-            <a:r>
-              <a:rPr lang="en-US" sz="2400" dirty="0" smtClean="0"/>
-              <a:t>project metadata</a:t>
-            </a:r>
-            <a:endParaRPr lang="en-US" sz="2400" dirty="0" smtClean="0"/>
+              <a:t>Exploit R “attributes” to capture project metadata</a:t>
+            </a:r>
           </a:p>
           <a:p>
             <a:pPr marL="920750" lvl="1" indent="-457200">
@@ -14886,11 +14636,11 @@
             </a:r>
             <a:r>
               <a:rPr lang="en-US" sz="1800" b="0" dirty="0" smtClean="0"/>
-              <a:t>, </a:t>
-            </a:r>
-            <a:r>
-              <a:rPr lang="en-US" sz="1800" b="0" dirty="0" smtClean="0"/>
-              <a:t>Platform technology, TA</a:t>
+              <a:t>, Platform technology, TA, </a:t>
+            </a:r>
+            <a:r>
+              <a:rPr lang="en-US" sz="1800" b="0" dirty="0" err="1" smtClean="0"/>
+              <a:t>GenomeBuild</a:t>
             </a:r>
             <a:r>
               <a:rPr lang="en-US" sz="1800" b="0" dirty="0" smtClean="0"/>
@@ -14898,14 +14648,6 @@
             </a:r>
             <a:r>
               <a:rPr lang="en-US" sz="1800" b="0" dirty="0" err="1" smtClean="0"/>
-              <a:t>GenomeBuild</a:t>
-            </a:r>
-            <a:r>
-              <a:rPr lang="en-US" sz="1800" b="0" dirty="0" smtClean="0"/>
-              <a:t>, </a:t>
-            </a:r>
-            <a:r>
-              <a:rPr lang="en-US" sz="1800" b="0" dirty="0" err="1" smtClean="0"/>
               <a:t>GeneModel</a:t>
             </a:r>
             <a:r>
@@ -14920,7 +14662,6 @@
               <a:rPr lang="en-US" sz="1800" b="0" dirty="0" smtClean="0"/>
               <a:t> analyst, etc. </a:t>
             </a:r>
-            <a:endParaRPr lang="en-US" sz="1800" b="0" dirty="0" smtClean="0"/>
           </a:p>
           <a:p>
             <a:pPr marL="920750" lvl="1" indent="-457200">
@@ -14929,21 +14670,8 @@
             </a:pPr>
             <a:r>
               <a:rPr lang="en-US" sz="1800" b="0" dirty="0" smtClean="0"/>
-              <a:t>Captures r</a:t>
-            </a:r>
-            <a:r>
-              <a:rPr lang="en-US" sz="1800" b="0" dirty="0" smtClean="0"/>
-              <a:t>elationships </a:t>
-            </a:r>
-            <a:r>
-              <a:rPr lang="en-US" sz="1800" b="0" dirty="0" smtClean="0"/>
-              <a:t>between </a:t>
-            </a:r>
-            <a:r>
-              <a:rPr lang="en-US" sz="1800" b="0" dirty="0" smtClean="0"/>
-              <a:t>data objects </a:t>
-            </a:r>
-            <a:endParaRPr lang="en-US" sz="1800" b="0" dirty="0" smtClean="0"/>
+              <a:t>Captures relationships between data objects </a:t>
+            </a:r>
           </a:p>
           <a:p>
             <a:pPr marL="1252538" lvl="2" indent="-457200">
@@ -14964,7 +14692,6 @@
               <a:rPr lang="en-US" sz="1600" b="0" dirty="0" smtClean="0"/>
               <a:t>e.g. multiple formulas, fits and contrasts from one set of raw data</a:t>
             </a:r>
-            <a:endParaRPr lang="en-US" sz="1600" b="0" dirty="0" smtClean="0"/>
           </a:p>
           <a:p>
             <a:endParaRPr lang="en-US" sz="2400" dirty="0" smtClean="0"/>
@@ -15081,11 +14808,7 @@
           <a:p>
             <a:r>
               <a:rPr lang="en-US" sz="2400" dirty="0" smtClean="0"/>
-              <a:t>Constructor </a:t>
-            </a:r>
-            <a:r>
-              <a:rPr lang="en-US" sz="2400" dirty="0" smtClean="0"/>
-              <a:t>functions: </a:t>
+              <a:t>Constructor functions: </a:t>
             </a:r>
           </a:p>
           <a:p>
@@ -15095,23 +14818,7 @@
             </a:pPr>
             <a:r>
               <a:rPr lang="en-US" sz="2000" b="0" dirty="0" smtClean="0"/>
-              <a:t>counts </a:t>
-            </a:r>
-            <a:r>
-              <a:rPr lang="en-US" sz="2000" b="0" dirty="0" smtClean="0"/>
-              <a:t>+ gene </a:t>
-            </a:r>
-            <a:r>
-              <a:rPr lang="en-US" sz="2000" b="0" dirty="0" smtClean="0"/>
-              <a:t>+ </a:t>
-            </a:r>
-            <a:r>
-              <a:rPr lang="en-US" sz="2000" b="0" dirty="0" smtClean="0"/>
-              <a:t>sample annotation required to </a:t>
-            </a:r>
-            <a:r>
-              <a:rPr lang="en-US" sz="2000" b="0" dirty="0" smtClean="0"/>
-              <a:t>build a </a:t>
+              <a:t>counts + gene + sample annotation required to build a </a:t>
             </a:r>
             <a:r>
               <a:rPr lang="en-US" sz="2000" b="0" dirty="0" err="1" smtClean="0"/>
@@ -15168,7 +14875,6 @@
               <a:rPr lang="en-US" sz="2000" b="0" dirty="0" smtClean="0"/>
               <a:t>)</a:t>
             </a:r>
-            <a:endParaRPr lang="en-US" sz="2000" b="0" dirty="0" smtClean="0"/>
           </a:p>
           <a:p>
             <a:pPr marL="920750" lvl="1" indent="-457200">
@@ -15192,11 +14898,7 @@
             </a:r>
             <a:r>
               <a:rPr lang="en-US" sz="2000" b="0" dirty="0" smtClean="0"/>
-              <a:t>, </a:t>
-            </a:r>
-            <a:r>
-              <a:rPr lang="en-US" sz="2000" b="0" dirty="0" smtClean="0"/>
-              <a:t>“counts”)</a:t>
+              <a:t>, “counts”)</a:t>
             </a:r>
           </a:p>
           <a:p>
@@ -15267,11 +14969,7 @@
             </a:r>
             <a:r>
               <a:rPr lang="en-US" sz="1400" b="0" dirty="0" smtClean="0"/>
-              <a:t>[1:1000</a:t>
-            </a:r>
-            <a:r>
-              <a:rPr lang="en-US" sz="1400" b="0" dirty="0" smtClean="0"/>
-              <a:t>, 1:5]  (subset the 1</a:t>
+              <a:t>[1:1000, 1:5]  (subset the 1</a:t>
             </a:r>
             <a:r>
               <a:rPr lang="en-US" sz="1400" b="0" baseline="30000" dirty="0" smtClean="0"/>
@@ -15287,13 +14985,8 @@
             </a:r>
             <a:r>
               <a:rPr lang="en-US" sz="1400" b="0" dirty="0" smtClean="0"/>
-              <a:t> 5 </a:t>
-            </a:r>
-            <a:r>
-              <a:rPr lang="en-US" sz="1400" b="0" dirty="0" smtClean="0"/>
-              <a:t>samples)</a:t>
-            </a:r>
-            <a:endParaRPr lang="en-US" sz="1400" b="0" dirty="0" smtClean="0"/>
+              <a:t> 5 samples)</a:t>
+            </a:r>
           </a:p>
           <a:p>
             <a:pPr marL="1252538" lvl="2" indent="-457200">
@@ -15708,11 +15401,7 @@
             </a:r>
             <a:r>
               <a:rPr lang="en-US" b="0" dirty="0" smtClean="0"/>
-              <a:t> </a:t>
-            </a:r>
-            <a:r>
-              <a:rPr lang="en-US" b="0" dirty="0" smtClean="0"/>
-              <a:t>= “IHC”,</a:t>
+              <a:t> = “IHC”,</a:t>
             </a:r>
             <a:r>
               <a:rPr lang="en-US" b="0" dirty="0"/>
@@ -15760,15 +15449,7 @@
             </a:r>
             <a:r>
               <a:rPr lang="en-US" dirty="0" smtClean="0"/>
-              <a:t> is unique </a:t>
-            </a:r>
-            <a:r>
-              <a:rPr lang="en-US" dirty="0" smtClean="0"/>
-              <a:t>(i.e. can </a:t>
-            </a:r>
-            <a:r>
-              <a:rPr lang="en-US" dirty="0" smtClean="0"/>
-              <a:t>only have one instance)</a:t>
+              <a:t> is unique (i.e. can only have one instance)</a:t>
             </a:r>
           </a:p>
           <a:p>
@@ -15778,15 +15459,7 @@
             </a:pPr>
             <a:r>
               <a:rPr lang="en-US" b="0" dirty="0" smtClean="0"/>
-              <a:t>For RNA-seq  “counts” </a:t>
-            </a:r>
-            <a:r>
-              <a:rPr lang="en-US" b="0" dirty="0" smtClean="0"/>
-              <a:t>item type </a:t>
-            </a:r>
-            <a:r>
-              <a:rPr lang="en-US" b="0" dirty="0" smtClean="0"/>
-              <a:t>is unique</a:t>
+              <a:t>For RNA-seq  “counts” item type is unique</a:t>
             </a:r>
           </a:p>
           <a:p>

</xml_diff>